<commit_message>
Add web address for faspxx
</commit_message>
<xml_diff>
--- a/manual/FaspxxFramework.pptx
+++ b/manual/FaspxxFramework.pptx
@@ -4909,7 +4909,7 @@
         </p:nvSpPr>
         <p:spPr>
           <a:xfrm>
-            <a:off x="361904" y="2715248"/>
+            <a:off x="361904" y="2633256"/>
             <a:ext cx="400110" cy="2370951"/>
           </a:xfrm>
           <a:prstGeom prst="rect">
@@ -4966,7 +4966,7 @@
         </p:nvSpPr>
         <p:spPr bwMode="auto">
           <a:xfrm>
-            <a:off x="3579813" y="6262688"/>
+            <a:off x="3697632" y="6262688"/>
             <a:ext cx="2363787" cy="307975"/>
           </a:xfrm>
           <a:prstGeom prst="rect">
@@ -7275,6 +7275,47 @@
           </p:txBody>
         </p:sp>
       </p:grpSp>
+      <p:sp>
+        <p:nvSpPr>
+          <p:cNvPr id="10" name="矩形 9">
+            <a:extLst>
+              <a:ext uri="{FF2B5EF4-FFF2-40B4-BE49-F238E27FC236}">
+                <a16:creationId xmlns:a16="http://schemas.microsoft.com/office/drawing/2014/main" id="{5D87F468-C0DC-4B32-BBEE-CE0BA464AF41}"/>
+              </a:ext>
+            </a:extLst>
+          </p:cNvPr>
+          <p:cNvSpPr/>
+          <p:nvPr/>
+        </p:nvSpPr>
+        <p:spPr>
+          <a:xfrm>
+            <a:off x="9055918" y="6315133"/>
+            <a:ext cx="3137757" cy="307777"/>
+          </a:xfrm>
+          <a:prstGeom prst="rect">
+            <a:avLst/>
+          </a:prstGeom>
+        </p:spPr>
+        <p:txBody>
+          <a:bodyPr wrap="square">
+            <a:spAutoFit/>
+          </a:bodyPr>
+          <a:lstStyle/>
+          <a:p>
+            <a:pPr algn="ctr"/>
+            <a:r>
+              <a:rPr lang="zh-CN" altLang="en-US" sz="1400" dirty="0">
+                <a:solidFill>
+                  <a:schemeClr val="tx2">
+                    <a:lumMod val="75000"/>
+                  </a:schemeClr>
+                </a:solidFill>
+              </a:rPr>
+              <a:t>https://faspdevteam.github.io/faspxx/</a:t>
+            </a:r>
+          </a:p>
+        </p:txBody>
+      </p:sp>
     </p:spTree>
     <p:extLst>
       <p:ext uri="{BB962C8B-B14F-4D97-AF65-F5344CB8AC3E}">

</xml_diff>

<commit_message>
Modify the design figure
</commit_message>
<xml_diff>
--- a/manual/FaspxxFramework.pptx
+++ b/manual/FaspxxFramework.pptx
@@ -9,6 +9,9 @@
   </p:sldIdLst>
   <p:sldSz cx="12192000" cy="6858000"/>
   <p:notesSz cx="7104063" cy="10234613"/>
+  <p:custDataLst>
+    <p:tags r:id="rId3"/>
+  </p:custDataLst>
   <p:defaultTextStyle>
     <a:defPPr>
       <a:defRPr lang="en-US"/>
@@ -106,7 +109,38 @@
   </p:defaultTextStyle>
   <p:extLst>
     <p:ext uri="{EFAFB233-063F-42B5-8137-9DF3F51BA10A}">
-      <p15:sldGuideLst xmlns:p15="http://schemas.microsoft.com/office/powerpoint/2012/main"/>
+      <p15:sldGuideLst xmlns:p15="http://schemas.microsoft.com/office/powerpoint/2012/main">
+        <p15:guide id="1" pos="192" userDrawn="1">
+          <p15:clr>
+            <a:srgbClr val="A4A3A4"/>
+          </p15:clr>
+        </p15:guide>
+        <p15:guide id="2" pos="7488" userDrawn="1">
+          <p15:clr>
+            <a:srgbClr val="A4A3A4"/>
+          </p15:clr>
+        </p15:guide>
+        <p15:guide id="3" orient="horz" pos="432" userDrawn="1">
+          <p15:clr>
+            <a:srgbClr val="A4A3A4"/>
+          </p15:clr>
+        </p15:guide>
+        <p15:guide id="4" orient="horz" pos="472" userDrawn="1">
+          <p15:clr>
+            <a:srgbClr val="A4A3A4"/>
+          </p15:clr>
+        </p15:guide>
+        <p15:guide id="5" orient="horz" pos="4104" userDrawn="1">
+          <p15:clr>
+            <a:srgbClr val="A4A3A4"/>
+          </p15:clr>
+        </p15:guide>
+        <p15:guide id="6" orient="horz" pos="4056" userDrawn="1">
+          <p15:clr>
+            <a:srgbClr val="A4A3A4"/>
+          </p15:clr>
+        </p15:guide>
+      </p15:sldGuideLst>
     </p:ext>
   </p:extLst>
 </p:presentation>
@@ -3306,6 +3340,42 @@
       </a:lvl9pPr>
     </p:otherStyle>
   </p:txStyles>
+  <p:extLst>
+    <p:ext uri="{27BBF7A9-308A-43DC-89C8-2F10F3537804}">
+      <p15:sldGuideLst xmlns:p15="http://schemas.microsoft.com/office/powerpoint/2012/main">
+        <p15:guide id="1" pos="192" userDrawn="1">
+          <p15:clr>
+            <a:srgbClr val="F26B43"/>
+          </p15:clr>
+        </p15:guide>
+        <p15:guide id="2" pos="7488" userDrawn="1">
+          <p15:clr>
+            <a:srgbClr val="F26B43"/>
+          </p15:clr>
+        </p15:guide>
+        <p15:guide id="3" orient="horz" pos="432" userDrawn="1">
+          <p15:clr>
+            <a:srgbClr val="F26B43"/>
+          </p15:clr>
+        </p15:guide>
+        <p15:guide id="4" orient="horz" pos="472" userDrawn="1">
+          <p15:clr>
+            <a:srgbClr val="F26B43"/>
+          </p15:clr>
+        </p15:guide>
+        <p15:guide id="5" orient="horz" pos="4104" userDrawn="1">
+          <p15:clr>
+            <a:srgbClr val="F26B43"/>
+          </p15:clr>
+        </p15:guide>
+        <p15:guide id="6" orient="horz" pos="4056" userDrawn="1">
+          <p15:clr>
+            <a:srgbClr val="F26B43"/>
+          </p15:clr>
+        </p15:guide>
+      </p15:sldGuideLst>
+    </p:ext>
+  </p:extLst>
 </p:sldMaster>
 </file>
 
@@ -3328,6 +3398,183 @@
       </p:grpSpPr>
       <p:sp>
         <p:nvSpPr>
+          <p:cNvPr id="47" name="矩形 46">
+            <a:extLst>
+              <a:ext uri="{FF2B5EF4-FFF2-40B4-BE49-F238E27FC236}">
+                <a16:creationId xmlns:a16="http://schemas.microsoft.com/office/drawing/2014/main" id="{CD6608D6-255C-4FAA-A037-E5DCC31159DA}"/>
+              </a:ext>
+            </a:extLst>
+          </p:cNvPr>
+          <p:cNvSpPr/>
+          <p:nvPr/>
+        </p:nvSpPr>
+        <p:spPr>
+          <a:xfrm>
+            <a:off x="3997568" y="1714421"/>
+            <a:ext cx="4841524" cy="2435554"/>
+          </a:xfrm>
+          <a:prstGeom prst="rect">
+            <a:avLst/>
+          </a:prstGeom>
+          <a:solidFill>
+            <a:schemeClr val="bg1">
+              <a:lumMod val="95000"/>
+            </a:schemeClr>
+          </a:solidFill>
+          <a:ln>
+            <a:noFill/>
+          </a:ln>
+        </p:spPr>
+        <p:style>
+          <a:lnRef idx="2">
+            <a:schemeClr val="accent1">
+              <a:shade val="50000"/>
+            </a:schemeClr>
+          </a:lnRef>
+          <a:fillRef idx="1">
+            <a:schemeClr val="accent1"/>
+          </a:fillRef>
+          <a:effectRef idx="0">
+            <a:schemeClr val="accent1"/>
+          </a:effectRef>
+          <a:fontRef idx="minor">
+            <a:schemeClr val="lt1"/>
+          </a:fontRef>
+        </p:style>
+        <p:txBody>
+          <a:bodyPr rtlCol="0" anchor="ctr"/>
+          <a:lstStyle/>
+          <a:p>
+            <a:pPr algn="ctr"/>
+            <a:endParaRPr lang="zh-CN" altLang="en-US"/>
+          </a:p>
+        </p:txBody>
+      </p:sp>
+      <p:sp>
+        <p:nvSpPr>
+          <p:cNvPr id="46" name="L 形 45">
+            <a:extLst>
+              <a:ext uri="{FF2B5EF4-FFF2-40B4-BE49-F238E27FC236}">
+                <a16:creationId xmlns:a16="http://schemas.microsoft.com/office/drawing/2014/main" id="{1DC5CEEE-A599-46A6-9CF5-EEB9E5DF408A}"/>
+              </a:ext>
+            </a:extLst>
+          </p:cNvPr>
+          <p:cNvSpPr/>
+          <p:nvPr/>
+        </p:nvSpPr>
+        <p:spPr>
+          <a:xfrm>
+            <a:off x="758653" y="1710519"/>
+            <a:ext cx="8075942" cy="4471610"/>
+          </a:xfrm>
+          <a:prstGeom prst="corner">
+            <a:avLst>
+              <a:gd name="adj1" fmla="val 45425"/>
+              <a:gd name="adj2" fmla="val 71951"/>
+            </a:avLst>
+          </a:prstGeom>
+          <a:solidFill>
+            <a:schemeClr val="accent2">
+              <a:lumMod val="20000"/>
+              <a:lumOff val="80000"/>
+            </a:schemeClr>
+          </a:solidFill>
+          <a:ln>
+            <a:noFill/>
+          </a:ln>
+        </p:spPr>
+        <p:style>
+          <a:lnRef idx="2">
+            <a:schemeClr val="accent1">
+              <a:shade val="50000"/>
+            </a:schemeClr>
+          </a:lnRef>
+          <a:fillRef idx="1">
+            <a:schemeClr val="accent1"/>
+          </a:fillRef>
+          <a:effectRef idx="0">
+            <a:schemeClr val="accent1"/>
+          </a:effectRef>
+          <a:fontRef idx="minor">
+            <a:schemeClr val="lt1"/>
+          </a:fontRef>
+        </p:style>
+        <p:txBody>
+          <a:bodyPr rtlCol="0" anchor="ctr"/>
+          <a:lstStyle/>
+          <a:p>
+            <a:pPr algn="ctr"/>
+            <a:endParaRPr lang="zh-CN" altLang="en-US">
+              <a:solidFill>
+                <a:schemeClr val="accent4">
+                  <a:lumMod val="20000"/>
+                  <a:lumOff val="80000"/>
+                </a:schemeClr>
+              </a:solidFill>
+            </a:endParaRPr>
+          </a:p>
+        </p:txBody>
+      </p:sp>
+      <p:sp>
+        <p:nvSpPr>
+          <p:cNvPr id="9" name="L 形 8">
+            <a:extLst>
+              <a:ext uri="{FF2B5EF4-FFF2-40B4-BE49-F238E27FC236}">
+                <a16:creationId xmlns:a16="http://schemas.microsoft.com/office/drawing/2014/main" id="{FA1C3A23-7C25-469C-B8CE-B1FA4E4E2AD4}"/>
+              </a:ext>
+            </a:extLst>
+          </p:cNvPr>
+          <p:cNvSpPr/>
+          <p:nvPr/>
+        </p:nvSpPr>
+        <p:spPr>
+          <a:xfrm>
+            <a:off x="758653" y="1710454"/>
+            <a:ext cx="6429900" cy="4478957"/>
+          </a:xfrm>
+          <a:prstGeom prst="corner">
+            <a:avLst>
+              <a:gd name="adj1" fmla="val 16458"/>
+              <a:gd name="adj2" fmla="val 31014"/>
+            </a:avLst>
+          </a:prstGeom>
+          <a:solidFill>
+            <a:schemeClr val="accent5">
+              <a:lumMod val="20000"/>
+              <a:lumOff val="80000"/>
+            </a:schemeClr>
+          </a:solidFill>
+          <a:ln>
+            <a:noFill/>
+          </a:ln>
+        </p:spPr>
+        <p:style>
+          <a:lnRef idx="2">
+            <a:schemeClr val="accent1">
+              <a:shade val="50000"/>
+            </a:schemeClr>
+          </a:lnRef>
+          <a:fillRef idx="1">
+            <a:schemeClr val="accent1"/>
+          </a:fillRef>
+          <a:effectRef idx="0">
+            <a:schemeClr val="accent1"/>
+          </a:effectRef>
+          <a:fontRef idx="minor">
+            <a:schemeClr val="lt1"/>
+          </a:fontRef>
+        </p:style>
+        <p:txBody>
+          <a:bodyPr rtlCol="0" anchor="ctr"/>
+          <a:lstStyle/>
+          <a:p>
+            <a:pPr algn="ctr"/>
+            <a:endParaRPr lang="zh-CN" altLang="en-US"/>
+          </a:p>
+        </p:txBody>
+      </p:sp>
+      <p:sp>
+        <p:nvSpPr>
           <p:cNvPr id="7" name="矩形 6">
             <a:extLst>
               <a:ext uri="{FF2B5EF4-FFF2-40B4-BE49-F238E27FC236}">
@@ -3353,10 +3600,15 @@
                   <a:lumMod val="50000"/>
                 </a:schemeClr>
               </a:gs>
-              <a:gs pos="87000">
-                <a:schemeClr val="accent4">
-                  <a:lumMod val="20000"/>
-                  <a:lumOff val="80000"/>
+              <a:gs pos="71000">
+                <a:schemeClr val="accent3">
+                  <a:lumMod val="60000"/>
+                  <a:lumOff val="40000"/>
+                </a:schemeClr>
+              </a:gs>
+              <a:gs pos="39000">
+                <a:schemeClr val="accent3">
+                  <a:lumMod val="75000"/>
                 </a:schemeClr>
               </a:gs>
               <a:gs pos="100000">
@@ -3408,7 +3660,7 @@
         </p:nvSpPr>
         <p:spPr bwMode="auto">
           <a:xfrm>
-            <a:off x="1022350" y="2320926"/>
+            <a:off x="958850" y="2161745"/>
             <a:ext cx="990600" cy="485775"/>
           </a:xfrm>
           <a:prstGeom prst="roundRect">
@@ -3467,7 +3719,7 @@
         </p:nvSpPr>
         <p:spPr bwMode="auto">
           <a:xfrm>
-            <a:off x="1022350" y="3433763"/>
+            <a:off x="958850" y="3287457"/>
             <a:ext cx="990600" cy="485775"/>
           </a:xfrm>
           <a:prstGeom prst="roundRect">
@@ -3526,7 +3778,7 @@
         </p:nvSpPr>
         <p:spPr bwMode="auto">
           <a:xfrm>
-            <a:off x="2590800" y="2319338"/>
+            <a:off x="2590800" y="2158570"/>
             <a:ext cx="990600" cy="488950"/>
           </a:xfrm>
           <a:prstGeom prst="roundRect">
@@ -3588,16 +3840,16 @@
         </p:nvCxnSpPr>
         <p:spPr bwMode="auto">
           <a:xfrm flipV="1">
-            <a:off x="2012950" y="2563813"/>
-            <a:ext cx="577850" cy="1112838"/>
+            <a:off x="1949450" y="2403045"/>
+            <a:ext cx="641350" cy="1127300"/>
           </a:xfrm>
           <a:prstGeom prst="bentConnector3">
             <a:avLst>
-              <a:gd name="adj1" fmla="val 60434"/>
+              <a:gd name="adj1" fmla="val 61639"/>
             </a:avLst>
           </a:prstGeom>
           <a:noFill/>
-          <a:ln w="28575" algn="ctr">
+          <a:ln w="19050" algn="ctr">
             <a:solidFill>
               <a:srgbClr val="2F1A14"/>
             </a:solidFill>
@@ -3628,7 +3880,7 @@
         </p:nvSpPr>
         <p:spPr bwMode="auto">
           <a:xfrm>
-            <a:off x="4230688" y="3433763"/>
+            <a:off x="4230688" y="3284106"/>
             <a:ext cx="990600" cy="485775"/>
           </a:xfrm>
           <a:prstGeom prst="roundRect">
@@ -3687,7 +3939,7 @@
         </p:nvSpPr>
         <p:spPr>
           <a:xfrm>
-            <a:off x="912813" y="1981200"/>
+            <a:off x="850107" y="1820640"/>
             <a:ext cx="1220787" cy="338138"/>
           </a:xfrm>
           <a:prstGeom prst="rect">
@@ -3733,7 +3985,7 @@
         </p:nvSpPr>
         <p:spPr>
           <a:xfrm>
-            <a:off x="612775" y="3071813"/>
+            <a:off x="619125" y="2931141"/>
             <a:ext cx="1682750" cy="339725"/>
           </a:xfrm>
           <a:prstGeom prst="rect">
@@ -3779,7 +4031,7 @@
         </p:nvSpPr>
         <p:spPr>
           <a:xfrm>
-            <a:off x="2279650" y="1981200"/>
+            <a:off x="2279650" y="1820432"/>
             <a:ext cx="1606550" cy="338554"/>
           </a:xfrm>
           <a:prstGeom prst="rect">
@@ -3825,7 +4077,7 @@
         </p:nvSpPr>
         <p:spPr>
           <a:xfrm>
-            <a:off x="3948283" y="3898106"/>
+            <a:off x="3948283" y="3762218"/>
             <a:ext cx="1517650" cy="338138"/>
           </a:xfrm>
           <a:prstGeom prst="rect">
@@ -3866,13 +4118,15 @@
               </a:ext>
             </a:extLst>
           </p:cNvPr>
-          <p:cNvSpPr/>
+          <p:cNvSpPr>
+            <a:spLocks/>
+          </p:cNvSpPr>
           <p:nvPr/>
         </p:nvSpPr>
         <p:spPr bwMode="auto">
           <a:xfrm>
-            <a:off x="3962400" y="4862513"/>
-            <a:ext cx="1752600" cy="641350"/>
+            <a:off x="3960289" y="4701745"/>
+            <a:ext cx="1568356" cy="641350"/>
           </a:xfrm>
           <a:prstGeom prst="snip1Rect">
             <a:avLst/>
@@ -3924,13 +4178,15 @@
               </a:ext>
             </a:extLst>
           </p:cNvPr>
-          <p:cNvSpPr/>
+          <p:cNvSpPr>
+            <a:spLocks/>
+          </p:cNvSpPr>
           <p:nvPr/>
         </p:nvSpPr>
         <p:spPr bwMode="auto">
           <a:xfrm>
-            <a:off x="5791200" y="4862513"/>
-            <a:ext cx="1600200" cy="641350"/>
+            <a:off x="5620196" y="4701745"/>
+            <a:ext cx="1568356" cy="641350"/>
           </a:xfrm>
           <a:prstGeom prst="snip1Rect">
             <a:avLst/>
@@ -3987,8 +4243,8 @@
         </p:nvSpPr>
         <p:spPr bwMode="auto">
           <a:xfrm>
-            <a:off x="3962400" y="4446588"/>
-            <a:ext cx="3429000" cy="352425"/>
+            <a:off x="3960289" y="4285820"/>
+            <a:ext cx="3228263" cy="352425"/>
           </a:xfrm>
           <a:prstGeom prst="snip1Rect">
             <a:avLst/>
@@ -4045,16 +4301,17 @@
         </p:nvSpPr>
         <p:spPr>
           <a:xfrm>
-            <a:off x="762000" y="180640"/>
-            <a:ext cx="8184382" cy="1016000"/>
+            <a:off x="754856" y="270288"/>
+            <a:ext cx="8091043" cy="1015663"/>
           </a:xfrm>
           <a:prstGeom prst="rect">
             <a:avLst/>
           </a:prstGeom>
           <a:noFill/>
-          <a:ln w="19050">
+          <a:ln w="28575">
             <a:solidFill>
-              <a:schemeClr val="tx1">
+              <a:schemeClr val="bg2">
+                <a:lumMod val="25000"/>
                 <a:alpha val="62000"/>
               </a:schemeClr>
             </a:solidFill>
@@ -4067,7 +4324,7 @@
           </a:bodyPr>
           <a:lstStyle/>
           <a:p>
-            <a:pPr eaLnBrk="1" hangingPunct="1">
+            <a:pPr>
               <a:defRPr/>
             </a:pPr>
             <a:r>
@@ -4094,6 +4351,30 @@
               <a:t> </a:t>
             </a:r>
             <a:r>
+              <a:rPr lang="en-US" altLang="zh-CN" sz="2000" dirty="0">
+                <a:solidFill>
+                  <a:schemeClr val="accent5">
+                    <a:lumMod val="75000"/>
+                  </a:schemeClr>
+                </a:solidFill>
+                <a:cs typeface="+mn-ea"/>
+                <a:sym typeface="+mn-lt"/>
+              </a:rPr>
+              <a:t>LOP </a:t>
+            </a:r>
+            <a:r>
+              <a:rPr lang="en-US" altLang="zh-CN" sz="2000" dirty="0">
+                <a:solidFill>
+                  <a:schemeClr val="accent3">
+                    <a:lumMod val="75000"/>
+                  </a:schemeClr>
+                </a:solidFill>
+                <a:cs typeface="+mn-ea"/>
+                <a:sym typeface="+mn-lt"/>
+              </a:rPr>
+              <a:t>:: </a:t>
+            </a:r>
+            <a:r>
               <a:rPr lang="en-US" sz="2000" dirty="0">
                 <a:solidFill>
                   <a:schemeClr val="accent3">
@@ -4103,7 +4384,67 @@
                 <a:cs typeface="+mn-ea"/>
                 <a:sym typeface="+mn-lt"/>
               </a:rPr>
-              <a:t>Solver</a:t>
+              <a:t>Solve</a:t>
+            </a:r>
+            <a:r>
+              <a:rPr lang="en-US" sz="2000" dirty="0">
+                <a:cs typeface="+mn-ea"/>
+                <a:sym typeface="+mn-lt"/>
+              </a:rPr>
+              <a:t>(</a:t>
+            </a:r>
+            <a:r>
+              <a:rPr lang="en-US" sz="2000" dirty="0">
+                <a:solidFill>
+                  <a:schemeClr val="accent5">
+                    <a:lumMod val="75000"/>
+                  </a:schemeClr>
+                </a:solidFill>
+                <a:cs typeface="+mn-ea"/>
+                <a:sym typeface="+mn-lt"/>
+              </a:rPr>
+              <a:t>VEC&amp; </a:t>
+            </a:r>
+            <a:r>
+              <a:rPr lang="en-US" sz="2000" dirty="0">
+                <a:cs typeface="+mn-ea"/>
+                <a:sym typeface="+mn-lt"/>
+              </a:rPr>
+              <a:t>b, </a:t>
+            </a:r>
+            <a:r>
+              <a:rPr lang="en-US" sz="2000" dirty="0">
+                <a:solidFill>
+                  <a:schemeClr val="accent5">
+                    <a:lumMod val="75000"/>
+                  </a:schemeClr>
+                </a:solidFill>
+                <a:cs typeface="+mn-ea"/>
+                <a:sym typeface="+mn-lt"/>
+              </a:rPr>
+              <a:t>VEC&amp; </a:t>
+            </a:r>
+            <a:r>
+              <a:rPr lang="en-US" sz="2000" dirty="0">
+                <a:cs typeface="+mn-ea"/>
+                <a:sym typeface="+mn-lt"/>
+              </a:rPr>
+              <a:t>x)</a:t>
+            </a:r>
+          </a:p>
+          <a:p>
+            <a:pPr>
+              <a:defRPr/>
+            </a:pPr>
+            <a:r>
+              <a:rPr lang="en-US" sz="2000" dirty="0" err="1">
+                <a:solidFill>
+                  <a:srgbClr val="EB0000"/>
+                </a:solidFill>
+                <a:cs typeface="+mn-ea"/>
+                <a:sym typeface="+mn-lt"/>
+              </a:rPr>
+              <a:t>FaspRetCode</a:t>
             </a:r>
             <a:r>
               <a:rPr lang="en-US" sz="2000" dirty="0">
@@ -4119,21 +4460,7 @@
               <a:t> </a:t>
             </a:r>
             <a:r>
-              <a:rPr lang="en-US" sz="2000" dirty="0">
-                <a:cs typeface="+mn-ea"/>
-                <a:sym typeface="+mn-lt"/>
-              </a:rPr>
-              <a:t>(</a:t>
-            </a:r>
-            <a:r>
-              <a:rPr lang="zh-CN" altLang="en-US" sz="2000" dirty="0">
-                <a:cs typeface="+mn-ea"/>
-                <a:sym typeface="+mn-lt"/>
-              </a:rPr>
-              <a:t> </a:t>
-            </a:r>
-            <a:r>
-              <a:rPr lang="en-US" sz="2000" dirty="0">
+              <a:rPr lang="en-US" altLang="zh-CN" sz="2000" dirty="0">
                 <a:solidFill>
                   <a:schemeClr val="accent5">
                     <a:lumMod val="75000"/>
@@ -4142,14 +4469,38 @@
                 <a:cs typeface="+mn-ea"/>
                 <a:sym typeface="+mn-lt"/>
               </a:rPr>
-              <a:t>LOP&amp; </a:t>
+              <a:t>LOP </a:t>
+            </a:r>
+            <a:r>
+              <a:rPr lang="en-US" altLang="zh-CN" sz="2000" dirty="0">
+                <a:solidFill>
+                  <a:schemeClr val="accent3">
+                    <a:lumMod val="75000"/>
+                  </a:schemeClr>
+                </a:solidFill>
+                <a:cs typeface="+mn-ea"/>
+                <a:sym typeface="+mn-lt"/>
+              </a:rPr>
+              <a:t>:: </a:t>
+            </a:r>
+            <a:r>
+              <a:rPr lang="en-US" sz="2000" dirty="0">
+                <a:solidFill>
+                  <a:schemeClr val="accent3">
+                    <a:lumMod val="75000"/>
+                  </a:schemeClr>
+                </a:solidFill>
+                <a:cs typeface="+mn-ea"/>
+                <a:sym typeface="+mn-lt"/>
+              </a:rPr>
+              <a:t>Solve</a:t>
             </a:r>
             <a:r>
               <a:rPr lang="en-US" sz="2000" dirty="0">
                 <a:cs typeface="+mn-ea"/>
                 <a:sym typeface="+mn-lt"/>
               </a:rPr>
-              <a:t>A, </a:t>
+              <a:t>(</a:t>
             </a:r>
             <a:r>
               <a:rPr lang="en-US" sz="2000" dirty="0">
@@ -4187,25 +4538,30 @@
                 <a:cs typeface="+mn-ea"/>
                 <a:sym typeface="+mn-lt"/>
               </a:rPr>
-              <a:t>x</a:t>
-            </a:r>
-            <a:r>
-              <a:rPr lang="zh-CN" altLang="en-US" sz="2000" dirty="0">
+              <a:t>x, </a:t>
+            </a:r>
+            <a:r>
+              <a:rPr lang="en-US" sz="2000" dirty="0">
+                <a:solidFill>
+                  <a:schemeClr val="tx2">
+                    <a:lumMod val="75000"/>
+                  </a:schemeClr>
+                </a:solidFill>
                 <a:cs typeface="+mn-ea"/>
                 <a:sym typeface="+mn-lt"/>
               </a:rPr>
-              <a:t> </a:t>
+              <a:t>SOL&amp;</a:t>
             </a:r>
             <a:r>
               <a:rPr lang="en-US" sz="2000" dirty="0">
                 <a:cs typeface="+mn-ea"/>
                 <a:sym typeface="+mn-lt"/>
               </a:rPr>
-              <a:t>)</a:t>
-            </a:r>
-          </a:p>
-          <a:p>
-            <a:pPr eaLnBrk="1" hangingPunct="1">
+              <a:t> pc)</a:t>
+            </a:r>
+          </a:p>
+          <a:p>
+            <a:pPr>
               <a:defRPr/>
             </a:pPr>
             <a:r>
@@ -4232,6 +4588,30 @@
               <a:t> </a:t>
             </a:r>
             <a:r>
+              <a:rPr lang="en-US" altLang="zh-CN" sz="2000" dirty="0">
+                <a:solidFill>
+                  <a:schemeClr val="accent4">
+                    <a:lumMod val="75000"/>
+                  </a:schemeClr>
+                </a:solidFill>
+                <a:cs typeface="+mn-ea"/>
+                <a:sym typeface="+mn-lt"/>
+              </a:rPr>
+              <a:t>MAT </a:t>
+            </a:r>
+            <a:r>
+              <a:rPr lang="en-US" altLang="zh-CN" sz="2000" dirty="0">
+                <a:solidFill>
+                  <a:schemeClr val="accent3">
+                    <a:lumMod val="75000"/>
+                  </a:schemeClr>
+                </a:solidFill>
+                <a:cs typeface="+mn-ea"/>
+                <a:sym typeface="+mn-lt"/>
+              </a:rPr>
+              <a:t>:: </a:t>
+            </a:r>
+            <a:r>
               <a:rPr lang="en-US" sz="2000" dirty="0">
                 <a:solidFill>
                   <a:schemeClr val="accent3">
@@ -4241,20 +4621,7 @@
                 <a:cs typeface="+mn-ea"/>
                 <a:sym typeface="+mn-lt"/>
               </a:rPr>
-              <a:t>Solver</a:t>
-            </a:r>
-            <a:r>
-              <a:rPr lang="en-US" sz="2000" dirty="0">
-                <a:solidFill>
-                  <a:schemeClr val="tx1">
-                    <a:lumMod val="50000"/>
-                    <a:lumOff val="50000"/>
-                  </a:schemeClr>
-                </a:solidFill>
-                <a:cs typeface="+mn-ea"/>
-                <a:sym typeface="+mn-lt"/>
-              </a:rPr>
-              <a:t> </a:t>
+              <a:t>Solve</a:t>
             </a:r>
             <a:r>
               <a:rPr lang="en-US" sz="2000" dirty="0">
@@ -4262,32 +4629,6 @@
                 <a:sym typeface="+mn-lt"/>
               </a:rPr>
               <a:t>(</a:t>
-            </a:r>
-            <a:r>
-              <a:rPr lang="zh-CN" altLang="en-US" sz="2000" dirty="0">
-                <a:cs typeface="+mn-ea"/>
-                <a:sym typeface="+mn-lt"/>
-              </a:rPr>
-              <a:t> </a:t>
-            </a:r>
-            <a:r>
-              <a:rPr lang="en-US" sz="2000" dirty="0">
-                <a:solidFill>
-                  <a:schemeClr val="accent5">
-                    <a:lumMod val="75000"/>
-                  </a:schemeClr>
-                </a:solidFill>
-                <a:cs typeface="+mn-ea"/>
-                <a:sym typeface="+mn-lt"/>
-              </a:rPr>
-              <a:t>LOP&amp; </a:t>
-            </a:r>
-            <a:r>
-              <a:rPr lang="en-US" sz="2000" dirty="0">
-                <a:cs typeface="+mn-ea"/>
-                <a:sym typeface="+mn-lt"/>
-              </a:rPr>
-              <a:t>A, </a:t>
             </a:r>
             <a:r>
               <a:rPr lang="en-US" sz="2000" dirty="0">
@@ -4344,190 +4685,7 @@
                 <a:cs typeface="+mn-ea"/>
                 <a:sym typeface="+mn-lt"/>
               </a:rPr>
-              <a:t> pc</a:t>
-            </a:r>
-            <a:r>
-              <a:rPr lang="zh-CN" altLang="en-US" sz="2000" dirty="0">
-                <a:cs typeface="+mn-ea"/>
-                <a:sym typeface="+mn-lt"/>
-              </a:rPr>
-              <a:t> </a:t>
-            </a:r>
-            <a:r>
-              <a:rPr lang="en-US" sz="2000" dirty="0">
-                <a:cs typeface="+mn-ea"/>
-                <a:sym typeface="+mn-lt"/>
-              </a:rPr>
-              <a:t>)</a:t>
-            </a:r>
-          </a:p>
-          <a:p>
-            <a:pPr eaLnBrk="1" hangingPunct="1">
-              <a:defRPr/>
-            </a:pPr>
-            <a:r>
-              <a:rPr lang="en-US" sz="2000" dirty="0" err="1">
-                <a:solidFill>
-                  <a:srgbClr val="EB0000"/>
-                </a:solidFill>
-                <a:cs typeface="+mn-ea"/>
-                <a:sym typeface="+mn-lt"/>
-              </a:rPr>
-              <a:t>FaspRetCode</a:t>
-            </a:r>
-            <a:r>
-              <a:rPr lang="en-US" sz="2000" dirty="0">
-                <a:solidFill>
-                  <a:schemeClr val="tx1">
-                    <a:lumMod val="50000"/>
-                    <a:lumOff val="50000"/>
-                  </a:schemeClr>
-                </a:solidFill>
-                <a:cs typeface="+mn-ea"/>
-                <a:sym typeface="+mn-lt"/>
-              </a:rPr>
-              <a:t> </a:t>
-            </a:r>
-            <a:r>
-              <a:rPr lang="en-US" sz="2000" dirty="0">
-                <a:solidFill>
-                  <a:schemeClr val="accent3">
-                    <a:lumMod val="75000"/>
-                  </a:schemeClr>
-                </a:solidFill>
-                <a:cs typeface="+mn-ea"/>
-                <a:sym typeface="+mn-lt"/>
-              </a:rPr>
-              <a:t>Solver</a:t>
-            </a:r>
-            <a:r>
-              <a:rPr lang="en-US" sz="2000" dirty="0">
-                <a:solidFill>
-                  <a:schemeClr val="tx1">
-                    <a:lumMod val="50000"/>
-                    <a:lumOff val="50000"/>
-                  </a:schemeClr>
-                </a:solidFill>
-                <a:cs typeface="+mn-ea"/>
-                <a:sym typeface="+mn-lt"/>
-              </a:rPr>
-              <a:t> </a:t>
-            </a:r>
-            <a:r>
-              <a:rPr lang="en-US" sz="2000" dirty="0">
-                <a:cs typeface="+mn-ea"/>
-                <a:sym typeface="+mn-lt"/>
-              </a:rPr>
-              <a:t>(</a:t>
-            </a:r>
-            <a:r>
-              <a:rPr lang="zh-CN" altLang="en-US" sz="2000" dirty="0">
-                <a:cs typeface="+mn-ea"/>
-                <a:sym typeface="+mn-lt"/>
-              </a:rPr>
-              <a:t> </a:t>
-            </a:r>
-            <a:r>
-              <a:rPr lang="en-US" altLang="zh-CN" sz="2000" dirty="0">
-                <a:solidFill>
-                  <a:schemeClr val="accent4">
-                    <a:lumMod val="75000"/>
-                  </a:schemeClr>
-                </a:solidFill>
-                <a:cs typeface="+mn-ea"/>
-                <a:sym typeface="+mn-lt"/>
-              </a:rPr>
-              <a:t>MAT</a:t>
-            </a:r>
-            <a:r>
-              <a:rPr lang="en-US" sz="2000" dirty="0">
-                <a:solidFill>
-                  <a:schemeClr val="accent4">
-                    <a:lumMod val="75000"/>
-                  </a:schemeClr>
-                </a:solidFill>
-                <a:cs typeface="+mn-ea"/>
-                <a:sym typeface="+mn-lt"/>
-              </a:rPr>
-              <a:t>&amp;</a:t>
-            </a:r>
-            <a:r>
-              <a:rPr lang="en-US" sz="2000" dirty="0">
-                <a:cs typeface="+mn-ea"/>
-                <a:sym typeface="+mn-lt"/>
-              </a:rPr>
-              <a:t> A, </a:t>
-            </a:r>
-            <a:r>
-              <a:rPr lang="en-US" sz="2000" dirty="0">
-                <a:solidFill>
-                  <a:schemeClr val="accent5">
-                    <a:lumMod val="75000"/>
-                  </a:schemeClr>
-                </a:solidFill>
-                <a:cs typeface="+mn-ea"/>
-                <a:sym typeface="+mn-lt"/>
-              </a:rPr>
-              <a:t>VEC&amp; </a:t>
-            </a:r>
-            <a:r>
-              <a:rPr lang="en-US" sz="2000" dirty="0">
-                <a:cs typeface="+mn-ea"/>
-                <a:sym typeface="+mn-lt"/>
-              </a:rPr>
-              <a:t>b, </a:t>
-            </a:r>
-            <a:r>
-              <a:rPr lang="en-US" sz="2000" dirty="0">
-                <a:solidFill>
-                  <a:schemeClr val="accent5">
-                    <a:lumMod val="75000"/>
-                  </a:schemeClr>
-                </a:solidFill>
-                <a:cs typeface="+mn-ea"/>
-                <a:sym typeface="+mn-lt"/>
-              </a:rPr>
-              <a:t>VEC&amp; </a:t>
-            </a:r>
-            <a:r>
-              <a:rPr lang="en-US" sz="2000" dirty="0">
-                <a:cs typeface="+mn-ea"/>
-                <a:sym typeface="+mn-lt"/>
-              </a:rPr>
-              <a:t>x, </a:t>
-            </a:r>
-            <a:r>
-              <a:rPr lang="en-US" sz="2000" dirty="0">
-                <a:solidFill>
-                  <a:schemeClr val="tx2">
-                    <a:lumMod val="75000"/>
-                  </a:schemeClr>
-                </a:solidFill>
-                <a:cs typeface="+mn-ea"/>
-                <a:sym typeface="+mn-lt"/>
-              </a:rPr>
-              <a:t>SOL&amp;</a:t>
-            </a:r>
-            <a:r>
-              <a:rPr lang="en-US" sz="2000" dirty="0">
-                <a:cs typeface="+mn-ea"/>
-                <a:sym typeface="+mn-lt"/>
-              </a:rPr>
-              <a:t> pc</a:t>
-            </a:r>
-            <a:r>
-              <a:rPr lang="zh-CN" altLang="en-US" sz="2000" dirty="0">
-                <a:cs typeface="+mn-ea"/>
-                <a:sym typeface="+mn-lt"/>
-              </a:rPr>
-              <a:t> </a:t>
-            </a:r>
-            <a:r>
-              <a:rPr lang="en-US" sz="2000" dirty="0">
-                <a:cs typeface="+mn-ea"/>
-                <a:sym typeface="+mn-lt"/>
-              </a:rPr>
-              <a:t>)</a:t>
+              <a:t> pc, Param&amp; par)</a:t>
             </a:r>
           </a:p>
         </p:txBody>
@@ -4546,8 +4704,8 @@
         </p:nvSpPr>
         <p:spPr bwMode="auto">
           <a:xfrm>
-            <a:off x="1022350" y="5662613"/>
-            <a:ext cx="6369050" cy="527050"/>
+            <a:off x="958620" y="5542055"/>
+            <a:ext cx="6029983" cy="527050"/>
           </a:xfrm>
           <a:prstGeom prst="roundRect">
             <a:avLst/>
@@ -4609,7 +4767,7 @@
         </p:nvSpPr>
         <p:spPr bwMode="auto">
           <a:xfrm>
-            <a:off x="2286000" y="4437063"/>
+            <a:off x="2286000" y="4276295"/>
             <a:ext cx="1582738" cy="1079500"/>
           </a:xfrm>
           <a:prstGeom prst="snip1Rect">
@@ -4667,7 +4825,7 @@
         </p:nvSpPr>
         <p:spPr bwMode="auto">
           <a:xfrm>
-            <a:off x="1022350" y="4548188"/>
+            <a:off x="958850" y="4414756"/>
             <a:ext cx="990600" cy="485775"/>
           </a:xfrm>
           <a:prstGeom prst="roundRect">
@@ -4726,7 +4884,7 @@
         </p:nvSpPr>
         <p:spPr>
           <a:xfrm>
-            <a:off x="671513" y="4208463"/>
+            <a:off x="642144" y="4062767"/>
             <a:ext cx="1636712" cy="338137"/>
           </a:xfrm>
           <a:prstGeom prst="rect">
@@ -4772,8 +4930,8 @@
         </p:nvSpPr>
         <p:spPr bwMode="auto">
           <a:xfrm>
-            <a:off x="7577137" y="4445000"/>
-            <a:ext cx="1108913" cy="1744663"/>
+            <a:off x="7325153" y="4284232"/>
+            <a:ext cx="1360897" cy="1774825"/>
           </a:xfrm>
           <a:prstGeom prst="round2SameRect">
             <a:avLst/>
@@ -4831,8 +4989,8 @@
         </p:nvCxnSpPr>
         <p:spPr bwMode="auto">
           <a:xfrm flipV="1">
-            <a:off x="742950" y="1371600"/>
-            <a:ext cx="0" cy="4894263"/>
+            <a:off x="748602" y="1457011"/>
+            <a:ext cx="20219" cy="4707656"/>
           </a:xfrm>
           <a:prstGeom prst="straightConnector1">
             <a:avLst/>
@@ -4871,7 +5029,7 @@
         </p:nvCxnSpPr>
         <p:spPr bwMode="auto">
           <a:xfrm>
-            <a:off x="742950" y="6246813"/>
+            <a:off x="754856" y="6189412"/>
             <a:ext cx="8273151" cy="12571"/>
           </a:xfrm>
           <a:prstGeom prst="straightConnector1">
@@ -4909,7 +5067,7 @@
         </p:nvSpPr>
         <p:spPr>
           <a:xfrm>
-            <a:off x="361904" y="2633256"/>
+            <a:off x="361904" y="2625364"/>
             <a:ext cx="400110" cy="2370951"/>
           </a:xfrm>
           <a:prstGeom prst="rect">
@@ -4966,7 +5124,7 @@
         </p:nvSpPr>
         <p:spPr bwMode="auto">
           <a:xfrm>
-            <a:off x="3697632" y="6262688"/>
+            <a:off x="3709538" y="6202048"/>
             <a:ext cx="2363787" cy="307975"/>
           </a:xfrm>
           <a:prstGeom prst="rect">
@@ -5060,8 +5218,8 @@
         </p:nvCxnSpPr>
         <p:spPr bwMode="auto">
           <a:xfrm>
-            <a:off x="7467600" y="5603875"/>
-            <a:ext cx="0" cy="661988"/>
+            <a:off x="7188552" y="5443107"/>
+            <a:ext cx="0" cy="758876"/>
           </a:xfrm>
           <a:prstGeom prst="line">
             <a:avLst/>
@@ -5112,7 +5270,7 @@
         </p:nvSpPr>
         <p:spPr bwMode="auto">
           <a:xfrm>
-            <a:off x="8120515" y="1371600"/>
+            <a:off x="8020032" y="1330897"/>
             <a:ext cx="825867" cy="369332"/>
           </a:xfrm>
           <a:prstGeom prst="rect">
@@ -5148,6 +5306,7 @@
           </a:bodyPr>
           <a:lstStyle/>
           <a:p>
+            <a:pPr algn="r"/>
             <a:r>
               <a:rPr lang="en-US" altLang="en-US" b="1" dirty="0">
                 <a:solidFill>
@@ -5179,7 +5338,7 @@
         </p:nvSpPr>
         <p:spPr bwMode="auto">
           <a:xfrm>
-            <a:off x="384996" y="6284356"/>
+            <a:off x="632961" y="6202048"/>
             <a:ext cx="1428596" cy="369332"/>
           </a:xfrm>
           <a:prstGeom prst="rect">
@@ -5246,14 +5405,14 @@
         </p:nvSpPr>
         <p:spPr bwMode="auto">
           <a:xfrm>
-            <a:off x="719138" y="6219825"/>
+            <a:off x="719138" y="6159185"/>
             <a:ext cx="71437" cy="73025"/>
           </a:xfrm>
           <a:prstGeom prst="ellipse">
             <a:avLst/>
           </a:prstGeom>
           <a:solidFill>
-            <a:schemeClr val="accent2"/>
+            <a:schemeClr val="tx1"/>
           </a:solidFill>
           <a:ln w="25400" algn="ctr">
             <a:solidFill>
@@ -5293,15 +5452,15 @@
           <p:nvPr/>
         </p:nvCxnSpPr>
         <p:spPr bwMode="auto">
-          <a:xfrm>
-            <a:off x="2012950" y="3676651"/>
-            <a:ext cx="2217738" cy="0"/>
+          <a:xfrm flipV="1">
+            <a:off x="1949450" y="3526994"/>
+            <a:ext cx="2281238" cy="3351"/>
           </a:xfrm>
           <a:prstGeom prst="straightConnector1">
             <a:avLst/>
           </a:prstGeom>
           <a:noFill/>
-          <a:ln w="28575" algn="ctr">
+          <a:ln w="19050" algn="ctr">
             <a:solidFill>
               <a:srgbClr val="2F1A14"/>
             </a:solidFill>
@@ -5334,12 +5493,12 @@
         </p:nvCxnSpPr>
         <p:spPr bwMode="auto">
           <a:xfrm>
-            <a:off x="762014" y="1758462"/>
-            <a:ext cx="6705586" cy="3827951"/>
+            <a:off x="776513" y="1714421"/>
+            <a:ext cx="6412039" cy="3728686"/>
           </a:xfrm>
           <a:prstGeom prst="bentConnector3">
             <a:avLst>
-              <a:gd name="adj1" fmla="val 21079"/>
+              <a:gd name="adj1" fmla="val 21322"/>
             </a:avLst>
           </a:prstGeom>
           <a:noFill/>
@@ -5379,12 +5538,12 @@
         </p:nvCxnSpPr>
         <p:spPr bwMode="auto">
           <a:xfrm>
-            <a:off x="2222501" y="1758462"/>
-            <a:ext cx="6623398" cy="2552281"/>
+            <a:off x="2179637" y="1714421"/>
+            <a:ext cx="6666262" cy="2435554"/>
           </a:xfrm>
           <a:prstGeom prst="bentConnector3">
             <a:avLst>
-              <a:gd name="adj1" fmla="val 26709"/>
+              <a:gd name="adj1" fmla="val 26938"/>
             </a:avLst>
           </a:prstGeom>
           <a:blipFill dpi="0" rotWithShape="0">
@@ -5423,8 +5582,8 @@
         </p:nvSpPr>
         <p:spPr bwMode="auto">
           <a:xfrm>
-            <a:off x="7581481" y="1915892"/>
-            <a:ext cx="1104568" cy="1028923"/>
+            <a:off x="7297295" y="1831483"/>
+            <a:ext cx="1388754" cy="952564"/>
           </a:xfrm>
           <a:prstGeom prst="round2SameRect">
             <a:avLst/>
@@ -5480,7 +5639,7 @@
         </p:nvSpPr>
         <p:spPr bwMode="auto">
           <a:xfrm>
-            <a:off x="4229100" y="2322513"/>
+            <a:off x="4229100" y="2161745"/>
             <a:ext cx="990600" cy="485775"/>
           </a:xfrm>
           <a:prstGeom prst="roundRect">
@@ -5539,7 +5698,7 @@
         </p:nvGrpSpPr>
         <p:grpSpPr>
           <a:xfrm>
-            <a:off x="5304577" y="3131656"/>
+            <a:off x="5304577" y="2970888"/>
             <a:ext cx="3387688" cy="1045818"/>
             <a:chOff x="5407096" y="3131656"/>
             <a:chExt cx="3387688" cy="1045818"/>
@@ -6032,9 +6191,9 @@
           <p:nvPr/>
         </p:nvCxnSpPr>
         <p:spPr bwMode="auto">
-          <a:xfrm>
-            <a:off x="8845899" y="4310743"/>
-            <a:ext cx="0" cy="1909082"/>
+          <a:xfrm flipH="1">
+            <a:off x="8834595" y="4149975"/>
+            <a:ext cx="11304" cy="2032154"/>
           </a:xfrm>
           <a:prstGeom prst="line">
             <a:avLst/>
@@ -6087,16 +6246,16 @@
         </p:nvCxnSpPr>
         <p:spPr bwMode="auto">
           <a:xfrm>
-            <a:off x="3581400" y="2563813"/>
-            <a:ext cx="649288" cy="1112838"/>
+            <a:off x="3581400" y="2403045"/>
+            <a:ext cx="649288" cy="1123949"/>
           </a:xfrm>
           <a:prstGeom prst="bentConnector3">
             <a:avLst>
-              <a:gd name="adj1" fmla="val 29881"/>
+              <a:gd name="adj1" fmla="val 28923"/>
             </a:avLst>
           </a:prstGeom>
           <a:noFill/>
-          <a:ln w="28575" algn="ctr">
+          <a:ln w="19050" algn="ctr">
             <a:solidFill>
               <a:srgbClr val="2F1A14"/>
             </a:solidFill>
@@ -6127,7 +6286,7 @@
         </p:nvGrpSpPr>
         <p:grpSpPr>
           <a:xfrm>
-            <a:off x="5304577" y="2019578"/>
+            <a:off x="5304577" y="1858810"/>
             <a:ext cx="1706634" cy="1045818"/>
             <a:chOff x="5304577" y="1959304"/>
             <a:chExt cx="1706634" cy="1045818"/>
@@ -6401,14 +6560,14 @@
         </p:nvCxnSpPr>
         <p:spPr bwMode="auto">
           <a:xfrm flipH="1" flipV="1">
-            <a:off x="4724400" y="2808288"/>
-            <a:ext cx="1588" cy="625475"/>
+            <a:off x="4724400" y="2647520"/>
+            <a:ext cx="1588" cy="636586"/>
           </a:xfrm>
           <a:prstGeom prst="straightConnector1">
             <a:avLst/>
           </a:prstGeom>
           <a:noFill/>
-          <a:ln w="28575" algn="ctr">
+          <a:ln w="19050" algn="ctr">
             <a:solidFill>
               <a:srgbClr val="2F1A14"/>
             </a:solidFill>
@@ -6441,8 +6600,8 @@
         </p:nvCxnSpPr>
         <p:spPr bwMode="auto">
           <a:xfrm>
-            <a:off x="4036660" y="1758462"/>
-            <a:ext cx="4809239" cy="2552281"/>
+            <a:off x="4036660" y="1714421"/>
+            <a:ext cx="4809239" cy="2435554"/>
           </a:xfrm>
           <a:prstGeom prst="bentConnector3">
             <a:avLst>
@@ -6485,10 +6644,10 @@
         </p:nvGrpSpPr>
         <p:grpSpPr>
           <a:xfrm>
-            <a:off x="9377992" y="160647"/>
-            <a:ext cx="2486965" cy="6094450"/>
-            <a:chOff x="9358084" y="160647"/>
-            <a:chExt cx="2486965" cy="6094450"/>
+            <a:off x="9377992" y="234208"/>
+            <a:ext cx="2486965" cy="6020889"/>
+            <a:chOff x="9358084" y="234208"/>
+            <a:chExt cx="2486965" cy="6020889"/>
           </a:xfrm>
         </p:grpSpPr>
         <p:sp>
@@ -6596,7 +6755,7 @@
               </a:solidFill>
             </a:ln>
             <a:effectLst>
-              <a:outerShdw blurRad="50800" dist="38100" dir="8100000" algn="tr" rotWithShape="0">
+              <a:outerShdw blurRad="50800" dist="63500" dir="8100000" algn="tr" rotWithShape="0">
                 <a:prstClr val="black">
                   <a:alpha val="40000"/>
                 </a:prstClr>
@@ -6805,7 +6964,7 @@
               </a:solidFill>
             </a:ln>
             <a:effectLst>
-              <a:outerShdw blurRad="50800" dist="38100" dir="8100000" algn="tr" rotWithShape="0">
+              <a:outerShdw blurRad="50800" dist="63500" dir="8100000" algn="tr" rotWithShape="0">
                 <a:prstClr val="black">
                   <a:alpha val="40000"/>
                 </a:prstClr>
@@ -6944,7 +7103,7 @@
               </a:solidFill>
             </a:ln>
             <a:effectLst>
-              <a:outerShdw blurRad="50800" dist="38100" dir="8100000" algn="tr" rotWithShape="0">
+              <a:outerShdw blurRad="50800" dist="63500" dir="8100000" algn="tr" rotWithShape="0">
                 <a:prstClr val="black">
                   <a:alpha val="40000"/>
                 </a:prstClr>
@@ -7013,7 +7172,7 @@
               </a:solidFill>
             </a:ln>
             <a:effectLst>
-              <a:outerShdw blurRad="50800" dist="38100" dir="8100000" algn="tr" rotWithShape="0">
+              <a:outerShdw blurRad="50800" dist="63500" dir="8100000" algn="tr" rotWithShape="0">
                 <a:prstClr val="black">
                   <a:alpha val="40000"/>
                 </a:prstClr>
@@ -7244,7 +7403,7 @@
           </p:nvSpPr>
           <p:spPr>
             <a:xfrm>
-              <a:off x="9887268" y="160647"/>
+              <a:off x="9887268" y="234208"/>
               <a:ext cx="1428596" cy="369332"/>
             </a:xfrm>
             <a:prstGeom prst="rect">
@@ -7289,7 +7448,7 @@
         </p:nvSpPr>
         <p:spPr>
           <a:xfrm>
-            <a:off x="9055918" y="6315133"/>
+            <a:off x="9055918" y="6263603"/>
             <a:ext cx="3137757" cy="307777"/>
           </a:xfrm>
           <a:prstGeom prst="rect">
@@ -7306,8 +7465,8 @@
             <a:r>
               <a:rPr lang="zh-CN" altLang="en-US" sz="1400" dirty="0">
                 <a:solidFill>
-                  <a:schemeClr val="tx2">
-                    <a:lumMod val="75000"/>
+                  <a:schemeClr val="accent4">
+                    <a:lumMod val="50000"/>
                   </a:schemeClr>
                 </a:solidFill>
               </a:rPr>
@@ -8477,6 +8636,12 @@
 </p:sld>
 </file>
 
+<file path=ppt/tags/tag1.xml><?xml version="1.0" encoding="utf-8"?>
+<p:tagLst xmlns:a="http://schemas.openxmlformats.org/drawingml/2006/main" xmlns:r="http://schemas.openxmlformats.org/officeDocument/2006/relationships" xmlns:p="http://schemas.openxmlformats.org/presentationml/2006/main">
+  <p:tag name="ISLIDE.GUIDESSETTING" val="{&quot;Id&quot;:&quot;GuidesStyle_Narrow&quot;,&quot;Name&quot;:&quot;较窄&quot;,&quot;Kind&quot;:&quot;System&quot;,&quot;OldGuidesSetting&quot;:{&quot;HeaderHeight&quot;:10.0,&quot;FooterHeight&quot;:5.0,&quot;SideMargin&quot;:2.5,&quot;TopMargin&quot;:0.0,&quot;BottomMargin&quot;:0.0,&quot;IntervalMargin&quot;:1.0}}"/>
+</p:tagLst>
+</file>
+
 <file path=ppt/theme/theme1.xml><?xml version="1.0" encoding="utf-8"?>
 <a:theme xmlns:a="http://schemas.openxmlformats.org/drawingml/2006/main" name="Office Theme">
   <a:themeElements>

</xml_diff>